<commit_message>
Actualización descripcion del caso
</commit_message>
<xml_diff>
--- a/docs/plan-de-proyecto/ppt-iteracion1.pptx
+++ b/docs/plan-de-proyecto/ppt-iteracion1.pptx
@@ -5,7 +5,7 @@
     <p:sldMasterId id="2147483732" r:id="rId1"/>
   </p:sldMasterIdLst>
   <p:notesMasterIdLst>
-    <p:notesMasterId r:id="rId8"/>
+    <p:notesMasterId r:id="rId11"/>
   </p:notesMasterIdLst>
   <p:sldIdLst>
     <p:sldId id="256" r:id="rId2"/>
@@ -14,6 +14,9 @@
     <p:sldId id="258" r:id="rId5"/>
     <p:sldId id="259" r:id="rId6"/>
     <p:sldId id="261" r:id="rId7"/>
+    <p:sldId id="262" r:id="rId8"/>
+    <p:sldId id="263" r:id="rId9"/>
+    <p:sldId id="264" r:id="rId10"/>
   </p:sldIdLst>
   <p:sldSz cx="9144000" cy="6858000" type="screen4x3"/>
   <p:notesSz cx="6858000" cy="9144000"/>
@@ -112,6 +115,11 @@
       </a:defRPr>
     </a:lvl9pPr>
   </p:defaultTextStyle>
+  <p:extLst>
+    <p:ext uri="{EFAFB233-063F-42B5-8137-9DF3F51BA10A}">
+      <p15:sldGuideLst xmlns:p15="http://schemas.microsoft.com/office/powerpoint/2012/main"/>
+    </p:ext>
+  </p:extLst>
 </p:presentation>
 </file>
 
@@ -8664,8 +8672,10 @@
           <a:bodyPr/>
           <a:lstStyle/>
           <a:p>
+            <a:pPr algn="ctr"/>
             <a:fld id="{82B5D99C-3243-4CCA-89CF-846763E29181}" type="slidenum">
               <a:rPr lang="es-CL" smtClean="0"/>
+              <a:pPr algn="ctr"/>
               <a:t>2</a:t>
             </a:fld>
             <a:endParaRPr lang="es-CL" dirty="0"/>
@@ -8846,8 +8856,10 @@
           <a:bodyPr/>
           <a:lstStyle/>
           <a:p>
+            <a:pPr algn="ctr"/>
             <a:fld id="{82B5D99C-3243-4CCA-89CF-846763E29181}" type="slidenum">
               <a:rPr lang="es-CL" smtClean="0"/>
+              <a:pPr algn="ctr"/>
               <a:t>3</a:t>
             </a:fld>
             <a:endParaRPr lang="es-CL" dirty="0"/>
@@ -9038,8 +9050,10 @@
           <a:bodyPr/>
           <a:lstStyle/>
           <a:p>
+            <a:pPr algn="ctr"/>
             <a:fld id="{82B5D99C-3243-4CCA-89CF-846763E29181}" type="slidenum">
               <a:rPr lang="es-CL" smtClean="0"/>
+              <a:pPr algn="ctr"/>
               <a:t>4</a:t>
             </a:fld>
             <a:endParaRPr lang="es-CL" dirty="0"/>
@@ -9204,8 +9218,10 @@
           <a:bodyPr/>
           <a:lstStyle/>
           <a:p>
+            <a:pPr algn="ctr"/>
             <a:fld id="{82B5D99C-3243-4CCA-89CF-846763E29181}" type="slidenum">
               <a:rPr lang="es-CL" smtClean="0"/>
+              <a:pPr algn="ctr"/>
               <a:t>5</a:t>
             </a:fld>
             <a:endParaRPr lang="es-CL" dirty="0"/>
@@ -9257,7 +9273,14 @@
           <a:bodyPr/>
           <a:lstStyle/>
           <a:p>
-            <a:endParaRPr lang="es-CL" dirty="0"/>
+            <a:r>
+              <a:rPr lang="es-CL" dirty="0" err="1"/>
+              <a:t>Descripcion</a:t>
+            </a:r>
+            <a:r>
+              <a:rPr lang="es-CL" dirty="0"/>
+              <a:t> del caso</a:t>
+            </a:r>
           </a:p>
         </p:txBody>
       </p:sp>
@@ -9276,6 +9299,29 @@
           <a:bodyPr/>
           <a:lstStyle/>
           <a:p>
+            <a:r>
+              <a:rPr lang="es-CL" dirty="0" err="1"/>
+              <a:t>Descripcion</a:t>
+            </a:r>
+            <a:r>
+              <a:rPr lang="es-CL" dirty="0"/>
+              <a:t> de la empresa</a:t>
+            </a:r>
+          </a:p>
+          <a:p>
+            <a:pPr marL="0" indent="0">
+              <a:buNone/>
+            </a:pPr>
+            <a:r>
+              <a:rPr lang="es-ES_tradnl" dirty="0"/>
+              <a:t>El centro médico Hipócrates es una institución dedicada a servicios de salud, que emplea a médicos, tecnólogos médicos, enfermeras y operadores para ofrecer diversos procedimientos a sus clientes, entre ellos consultas médicas, exámenes e imagenología. </a:t>
+            </a:r>
+            <a:endParaRPr lang="es-CL" dirty="0"/>
+          </a:p>
+          <a:p>
+            <a:pPr marL="0" indent="0">
+              <a:buNone/>
+            </a:pPr>
             <a:endParaRPr lang="es-CL" dirty="0"/>
           </a:p>
         </p:txBody>
@@ -9336,8 +9382,10 @@
           <a:bodyPr/>
           <a:lstStyle/>
           <a:p>
+            <a:pPr algn="ctr"/>
             <a:fld id="{82B5D99C-3243-4CCA-89CF-846763E29181}" type="slidenum">
               <a:rPr lang="es-CL" smtClean="0"/>
+              <a:pPr algn="ctr"/>
               <a:t>6</a:t>
             </a:fld>
             <a:endParaRPr lang="es-CL" dirty="0"/>
@@ -9348,6 +9396,738 @@
     <p:extLst>
       <p:ext uri="{BB962C8B-B14F-4D97-AF65-F5344CB8AC3E}">
         <p14:creationId xmlns:p14="http://schemas.microsoft.com/office/powerpoint/2010/main" val="392522673"/>
+      </p:ext>
+    </p:extLst>
+  </p:cSld>
+  <p:clrMapOvr>
+    <a:masterClrMapping/>
+  </p:clrMapOvr>
+</p:sld>
+</file>
+
+<file path=ppt/slides/slide7.xml><?xml version="1.0" encoding="utf-8"?>
+<p:sld xmlns:a="http://schemas.openxmlformats.org/drawingml/2006/main" xmlns:r="http://schemas.openxmlformats.org/officeDocument/2006/relationships" xmlns:p="http://schemas.openxmlformats.org/presentationml/2006/main">
+  <p:cSld>
+    <p:spTree>
+      <p:nvGrpSpPr>
+        <p:cNvPr id="1" name=""/>
+        <p:cNvGrpSpPr/>
+        <p:nvPr/>
+      </p:nvGrpSpPr>
+      <p:grpSpPr>
+        <a:xfrm>
+          <a:off x="0" y="0"/>
+          <a:ext cx="0" cy="0"/>
+          <a:chOff x="0" y="0"/>
+          <a:chExt cx="0" cy="0"/>
+        </a:xfrm>
+      </p:grpSpPr>
+      <p:sp>
+        <p:nvSpPr>
+          <p:cNvPr id="2" name="Title 1"/>
+          <p:cNvSpPr>
+            <a:spLocks noGrp="1"/>
+          </p:cNvSpPr>
+          <p:nvPr>
+            <p:ph type="title"/>
+          </p:nvPr>
+        </p:nvSpPr>
+        <p:spPr/>
+        <p:txBody>
+          <a:bodyPr/>
+          <a:lstStyle/>
+          <a:p>
+            <a:r>
+              <a:rPr lang="es-CL" dirty="0" err="1"/>
+              <a:t>Descripcion</a:t>
+            </a:r>
+            <a:r>
+              <a:rPr lang="es-CL" dirty="0"/>
+              <a:t> del caso</a:t>
+            </a:r>
+          </a:p>
+        </p:txBody>
+      </p:sp>
+      <p:sp>
+        <p:nvSpPr>
+          <p:cNvPr id="3" name="Content Placeholder 2"/>
+          <p:cNvSpPr>
+            <a:spLocks noGrp="1"/>
+          </p:cNvSpPr>
+          <p:nvPr>
+            <p:ph idx="1"/>
+          </p:nvPr>
+        </p:nvSpPr>
+        <p:spPr>
+          <a:xfrm>
+            <a:off x="531639" y="2155858"/>
+            <a:ext cx="6887389" cy="2024112"/>
+          </a:xfrm>
+        </p:spPr>
+        <p:txBody>
+          <a:bodyPr>
+            <a:normAutofit/>
+          </a:bodyPr>
+          <a:lstStyle/>
+          <a:p>
+            <a:r>
+              <a:rPr lang="es-CL" dirty="0" err="1"/>
+              <a:t>Descripcion</a:t>
+            </a:r>
+            <a:r>
+              <a:rPr lang="es-CL" dirty="0"/>
+              <a:t> del modelo de negocios</a:t>
+            </a:r>
+          </a:p>
+          <a:p>
+            <a:pPr marL="0" indent="0">
+              <a:buNone/>
+            </a:pPr>
+            <a:r>
+              <a:rPr lang="es-ES_tradnl" dirty="0"/>
+              <a:t>El documento provisto es insuficiente para derivar el modelo de negocios completo, sin embargo se puede generar un primer vistazo al modelo utilizando la herramienta CANVAS</a:t>
+            </a:r>
+          </a:p>
+        </p:txBody>
+      </p:sp>
+      <p:pic>
+        <p:nvPicPr>
+          <p:cNvPr id="2050" name="Picture 2" descr="Resultado de imagen para duoc"/>
+          <p:cNvPicPr>
+            <a:picLocks noChangeAspect="1" noChangeArrowheads="1"/>
+          </p:cNvPicPr>
+          <p:nvPr/>
+        </p:nvPicPr>
+        <p:blipFill>
+          <a:blip r:embed="rId2">
+            <a:extLst>
+              <a:ext uri="{28A0092B-C50C-407E-A947-70E740481C1C}">
+                <a14:useLocalDpi xmlns:a14="http://schemas.microsoft.com/office/drawing/2010/main" val="0"/>
+              </a:ext>
+            </a:extLst>
+          </a:blip>
+          <a:srcRect/>
+          <a:stretch>
+            <a:fillRect/>
+          </a:stretch>
+        </p:blipFill>
+        <p:spPr bwMode="auto">
+          <a:xfrm>
+            <a:off x="7770945" y="599455"/>
+            <a:ext cx="1373055" cy="307545"/>
+          </a:xfrm>
+          <a:prstGeom prst="rect">
+            <a:avLst/>
+          </a:prstGeom>
+          <a:noFill/>
+          <a:extLst>
+            <a:ext uri="{909E8E84-426E-40DD-AFC4-6F175D3DCCD1}">
+              <a14:hiddenFill xmlns:a14="http://schemas.microsoft.com/office/drawing/2010/main">
+                <a:solidFill>
+                  <a:srgbClr val="FFFFFF"/>
+                </a:solidFill>
+              </a14:hiddenFill>
+            </a:ext>
+          </a:extLst>
+        </p:spPr>
+      </p:pic>
+      <p:sp>
+        <p:nvSpPr>
+          <p:cNvPr id="5" name="Slide Number Placeholder 4"/>
+          <p:cNvSpPr>
+            <a:spLocks noGrp="1"/>
+          </p:cNvSpPr>
+          <p:nvPr>
+            <p:ph type="sldNum" sz="quarter" idx="12"/>
+          </p:nvPr>
+        </p:nvSpPr>
+        <p:spPr/>
+        <p:txBody>
+          <a:bodyPr/>
+          <a:lstStyle/>
+          <a:p>
+            <a:pPr algn="ctr"/>
+            <a:fld id="{82B5D99C-3243-4CCA-89CF-846763E29181}" type="slidenum">
+              <a:rPr lang="es-CL" smtClean="0"/>
+              <a:pPr algn="ctr"/>
+              <a:t>7</a:t>
+            </a:fld>
+            <a:endParaRPr lang="es-CL" dirty="0"/>
+          </a:p>
+        </p:txBody>
+      </p:sp>
+      <p:graphicFrame>
+        <p:nvGraphicFramePr>
+          <p:cNvPr id="4" name="Table 3"/>
+          <p:cNvGraphicFramePr>
+            <a:graphicFrameLocks noGrp="1"/>
+          </p:cNvGraphicFramePr>
+          <p:nvPr>
+            <p:extLst>
+              <p:ext uri="{D42A27DB-BD31-4B8C-83A1-F6EECF244321}">
+                <p14:modId xmlns:p14="http://schemas.microsoft.com/office/powerpoint/2010/main" val="938438664"/>
+              </p:ext>
+            </p:extLst>
+          </p:nvPr>
+        </p:nvGraphicFramePr>
+        <p:xfrm>
+          <a:off x="531639" y="4501662"/>
+          <a:ext cx="6887390" cy="1700355"/>
+        </p:xfrm>
+        <a:graphic>
+          <a:graphicData uri="http://schemas.openxmlformats.org/drawingml/2006/table">
+            <a:tbl>
+              <a:tblPr firstRow="1" bandRow="1">
+                <a:effectLst/>
+                <a:tableStyleId>{5C22544A-7EE6-4342-B048-85BDC9FD1C3A}</a:tableStyleId>
+              </a:tblPr>
+              <a:tblGrid>
+                <a:gridCol w="3443695">
+                  <a:extLst>
+                    <a:ext uri="{9D8B030D-6E8A-4147-A177-3AD203B41FA5}">
+                      <a16:colId xmlns:a16="http://schemas.microsoft.com/office/drawing/2014/main" val="576900497"/>
+                    </a:ext>
+                  </a:extLst>
+                </a:gridCol>
+                <a:gridCol w="3443695">
+                  <a:extLst>
+                    <a:ext uri="{9D8B030D-6E8A-4147-A177-3AD203B41FA5}">
+                      <a16:colId xmlns:a16="http://schemas.microsoft.com/office/drawing/2014/main" val="404792023"/>
+                    </a:ext>
+                  </a:extLst>
+                </a:gridCol>
+              </a:tblGrid>
+              <a:tr h="1700355">
+                <a:tc>
+                  <a:txBody>
+                    <a:bodyPr/>
+                    <a:lstStyle/>
+                    <a:p>
+                      <a:pPr marL="457200" indent="-457200">
+                        <a:buFont typeface="+mj-lt"/>
+                        <a:buAutoNum type="arabicPeriod"/>
+                      </a:pPr>
+                      <a:r>
+                        <a:rPr lang="es-ES_tradnl" sz="2000" b="0" i="0" dirty="0"/>
+                        <a:t>Segmento de clientes</a:t>
+                      </a:r>
+                    </a:p>
+                    <a:p>
+                      <a:pPr marL="457200" indent="-457200">
+                        <a:buFont typeface="+mj-lt"/>
+                        <a:buAutoNum type="arabicPeriod"/>
+                      </a:pPr>
+                      <a:r>
+                        <a:rPr lang="es-ES_tradnl" sz="2000" b="0" i="0" dirty="0"/>
+                        <a:t>Propuesta de valor</a:t>
+                      </a:r>
+                    </a:p>
+                    <a:p>
+                      <a:pPr marL="457200" indent="-457200">
+                        <a:buFont typeface="+mj-lt"/>
+                        <a:buAutoNum type="arabicPeriod"/>
+                      </a:pPr>
+                      <a:r>
+                        <a:rPr lang="es-ES_tradnl" sz="2000" b="0" i="0" dirty="0"/>
+                        <a:t>Canales</a:t>
+                      </a:r>
+                    </a:p>
+                    <a:p>
+                      <a:pPr marL="457200" indent="-457200">
+                        <a:buFont typeface="+mj-lt"/>
+                        <a:buAutoNum type="arabicPeriod"/>
+                      </a:pPr>
+                      <a:r>
+                        <a:rPr lang="es-ES_tradnl" sz="2000" b="0" i="0" dirty="0" err="1"/>
+                        <a:t>Relacion</a:t>
+                      </a:r>
+                      <a:r>
+                        <a:rPr lang="es-ES_tradnl" sz="2000" b="0" i="0" dirty="0"/>
+                        <a:t> con el cliente</a:t>
+                      </a:r>
+                    </a:p>
+                    <a:p>
+                      <a:pPr marL="457200" indent="-457200">
+                        <a:buFont typeface="+mj-lt"/>
+                        <a:buAutoNum type="arabicPeriod"/>
+                      </a:pPr>
+                      <a:r>
+                        <a:rPr lang="es-ES_tradnl" sz="2000" b="0" i="0" dirty="0"/>
+                        <a:t>Fuente de ingresos</a:t>
+                      </a:r>
+                    </a:p>
+                  </a:txBody>
+                  <a:tcPr>
+                    <a:lnL w="12700" cap="flat" cmpd="sng" algn="ctr">
+                      <a:solidFill>
+                        <a:schemeClr val="tx1"/>
+                      </a:solidFill>
+                      <a:prstDash val="solid"/>
+                      <a:round/>
+                      <a:headEnd type="none" w="med" len="med"/>
+                      <a:tailEnd type="none" w="med" len="med"/>
+                    </a:lnL>
+                    <a:lnR w="12700" cap="flat" cmpd="sng" algn="ctr">
+                      <a:solidFill>
+                        <a:schemeClr val="tx1"/>
+                      </a:solidFill>
+                      <a:prstDash val="solid"/>
+                      <a:round/>
+                      <a:headEnd type="none" w="med" len="med"/>
+                      <a:tailEnd type="none" w="med" len="med"/>
+                    </a:lnR>
+                    <a:lnT w="12700" cap="flat" cmpd="sng" algn="ctr">
+                      <a:solidFill>
+                        <a:schemeClr val="tx1"/>
+                      </a:solidFill>
+                      <a:prstDash val="solid"/>
+                      <a:round/>
+                      <a:headEnd type="none" w="med" len="med"/>
+                      <a:tailEnd type="none" w="med" len="med"/>
+                    </a:lnT>
+                    <a:lnB w="12700" cap="flat" cmpd="sng" algn="ctr">
+                      <a:solidFill>
+                        <a:schemeClr val="tx1"/>
+                      </a:solidFill>
+                      <a:prstDash val="solid"/>
+                      <a:round/>
+                      <a:headEnd type="none" w="med" len="med"/>
+                      <a:tailEnd type="none" w="med" len="med"/>
+                    </a:lnB>
+                    <a:lnTlToBr w="12700" cmpd="sng">
+                      <a:noFill/>
+                      <a:prstDash val="solid"/>
+                    </a:lnTlToBr>
+                    <a:lnBlToTr w="12700" cmpd="sng">
+                      <a:noFill/>
+                      <a:prstDash val="solid"/>
+                    </a:lnBlToTr>
+                    <a:noFill/>
+                  </a:tcPr>
+                </a:tc>
+                <a:tc>
+                  <a:txBody>
+                    <a:bodyPr/>
+                    <a:lstStyle/>
+                    <a:p>
+                      <a:pPr marL="457200" indent="-457200">
+                        <a:buFont typeface="+mj-lt"/>
+                        <a:buAutoNum type="arabicPeriod" startAt="6"/>
+                      </a:pPr>
+                      <a:r>
+                        <a:rPr lang="es-ES_tradnl" sz="2000" b="0" i="0" dirty="0"/>
+                        <a:t>Recursos</a:t>
+                      </a:r>
+                    </a:p>
+                    <a:p>
+                      <a:pPr marL="457200" indent="-457200">
+                        <a:buFont typeface="+mj-lt"/>
+                        <a:buAutoNum type="arabicPeriod" startAt="6"/>
+                      </a:pPr>
+                      <a:r>
+                        <a:rPr lang="es-ES_tradnl" sz="2000" b="0" i="0" dirty="0" err="1"/>
+                        <a:t>Actuvidades</a:t>
+                      </a:r>
+                      <a:r>
+                        <a:rPr lang="es-ES_tradnl" sz="2000" b="0" i="0" dirty="0"/>
+                        <a:t> clave</a:t>
+                      </a:r>
+                    </a:p>
+                    <a:p>
+                      <a:pPr marL="457200" indent="-457200">
+                        <a:buFont typeface="+mj-lt"/>
+                        <a:buAutoNum type="arabicPeriod" startAt="6"/>
+                      </a:pPr>
+                      <a:r>
+                        <a:rPr lang="es-ES_tradnl" sz="2000" b="0" i="0" dirty="0"/>
+                        <a:t>Socios</a:t>
+                      </a:r>
+                    </a:p>
+                    <a:p>
+                      <a:pPr marL="457200" indent="-457200">
+                        <a:buFont typeface="+mj-lt"/>
+                        <a:buAutoNum type="arabicPeriod" startAt="6"/>
+                      </a:pPr>
+                      <a:r>
+                        <a:rPr lang="es-ES_tradnl" sz="2000" b="0" i="0" dirty="0"/>
+                        <a:t>Estructura de costos</a:t>
+                      </a:r>
+                      <a:endParaRPr lang="es-CL" sz="2000" b="0" i="0" dirty="0"/>
+                    </a:p>
+                  </a:txBody>
+                  <a:tcPr>
+                    <a:lnL w="12700" cap="flat" cmpd="sng" algn="ctr">
+                      <a:solidFill>
+                        <a:schemeClr val="tx1"/>
+                      </a:solidFill>
+                      <a:prstDash val="solid"/>
+                      <a:round/>
+                      <a:headEnd type="none" w="med" len="med"/>
+                      <a:tailEnd type="none" w="med" len="med"/>
+                    </a:lnL>
+                    <a:lnR w="12700" cap="flat" cmpd="sng" algn="ctr">
+                      <a:solidFill>
+                        <a:schemeClr val="tx1"/>
+                      </a:solidFill>
+                      <a:prstDash val="solid"/>
+                      <a:round/>
+                      <a:headEnd type="none" w="med" len="med"/>
+                      <a:tailEnd type="none" w="med" len="med"/>
+                    </a:lnR>
+                    <a:lnT w="12700" cap="flat" cmpd="sng" algn="ctr">
+                      <a:solidFill>
+                        <a:schemeClr val="tx1"/>
+                      </a:solidFill>
+                      <a:prstDash val="solid"/>
+                      <a:round/>
+                      <a:headEnd type="none" w="med" len="med"/>
+                      <a:tailEnd type="none" w="med" len="med"/>
+                    </a:lnT>
+                    <a:lnB w="12700" cap="flat" cmpd="sng" algn="ctr">
+                      <a:solidFill>
+                        <a:schemeClr val="tx1"/>
+                      </a:solidFill>
+                      <a:prstDash val="solid"/>
+                      <a:round/>
+                      <a:headEnd type="none" w="med" len="med"/>
+                      <a:tailEnd type="none" w="med" len="med"/>
+                    </a:lnB>
+                    <a:lnTlToBr w="12700" cmpd="sng">
+                      <a:noFill/>
+                      <a:prstDash val="solid"/>
+                    </a:lnTlToBr>
+                    <a:lnBlToTr w="12700" cmpd="sng">
+                      <a:noFill/>
+                      <a:prstDash val="solid"/>
+                    </a:lnBlToTr>
+                    <a:noFill/>
+                  </a:tcPr>
+                </a:tc>
+                <a:extLst>
+                  <a:ext uri="{0D108BD9-81ED-4DB2-BD59-A6C34878D82A}">
+                    <a16:rowId xmlns:a16="http://schemas.microsoft.com/office/drawing/2014/main" val="687705351"/>
+                  </a:ext>
+                </a:extLst>
+              </a:tr>
+            </a:tbl>
+          </a:graphicData>
+        </a:graphic>
+      </p:graphicFrame>
+    </p:spTree>
+    <p:extLst>
+      <p:ext uri="{BB962C8B-B14F-4D97-AF65-F5344CB8AC3E}">
+        <p14:creationId xmlns:p14="http://schemas.microsoft.com/office/powerpoint/2010/main" val="2892776809"/>
+      </p:ext>
+    </p:extLst>
+  </p:cSld>
+  <p:clrMapOvr>
+    <a:masterClrMapping/>
+  </p:clrMapOvr>
+</p:sld>
+</file>
+
+<file path=ppt/slides/slide8.xml><?xml version="1.0" encoding="utf-8"?>
+<p:sld xmlns:a="http://schemas.openxmlformats.org/drawingml/2006/main" xmlns:r="http://schemas.openxmlformats.org/officeDocument/2006/relationships" xmlns:p="http://schemas.openxmlformats.org/presentationml/2006/main">
+  <p:cSld>
+    <p:spTree>
+      <p:nvGrpSpPr>
+        <p:cNvPr id="1" name=""/>
+        <p:cNvGrpSpPr/>
+        <p:nvPr/>
+      </p:nvGrpSpPr>
+      <p:grpSpPr>
+        <a:xfrm>
+          <a:off x="0" y="0"/>
+          <a:ext cx="0" cy="0"/>
+          <a:chOff x="0" y="0"/>
+          <a:chExt cx="0" cy="0"/>
+        </a:xfrm>
+      </p:grpSpPr>
+      <p:sp>
+        <p:nvSpPr>
+          <p:cNvPr id="2" name="Title 1"/>
+          <p:cNvSpPr>
+            <a:spLocks noGrp="1"/>
+          </p:cNvSpPr>
+          <p:nvPr>
+            <p:ph type="title"/>
+          </p:nvPr>
+        </p:nvSpPr>
+        <p:spPr/>
+        <p:txBody>
+          <a:bodyPr/>
+          <a:lstStyle/>
+          <a:p>
+            <a:r>
+              <a:rPr lang="es-CL" dirty="0" err="1"/>
+              <a:t>Descripcion</a:t>
+            </a:r>
+            <a:r>
+              <a:rPr lang="es-CL" dirty="0"/>
+              <a:t> del caso</a:t>
+            </a:r>
+          </a:p>
+        </p:txBody>
+      </p:sp>
+      <p:sp>
+        <p:nvSpPr>
+          <p:cNvPr id="3" name="Content Placeholder 2"/>
+          <p:cNvSpPr>
+            <a:spLocks noGrp="1"/>
+          </p:cNvSpPr>
+          <p:nvPr>
+            <p:ph idx="1"/>
+          </p:nvPr>
+        </p:nvSpPr>
+        <p:spPr/>
+        <p:txBody>
+          <a:bodyPr/>
+          <a:lstStyle/>
+          <a:p>
+            <a:r>
+              <a:rPr lang="es-CL" dirty="0" err="1"/>
+              <a:t>Descripcion</a:t>
+            </a:r>
+            <a:r>
+              <a:rPr lang="es-CL" dirty="0"/>
+              <a:t> del problema</a:t>
+            </a:r>
+          </a:p>
+        </p:txBody>
+      </p:sp>
+      <p:pic>
+        <p:nvPicPr>
+          <p:cNvPr id="2050" name="Picture 2" descr="Resultado de imagen para duoc"/>
+          <p:cNvPicPr>
+            <a:picLocks noChangeAspect="1" noChangeArrowheads="1"/>
+          </p:cNvPicPr>
+          <p:nvPr/>
+        </p:nvPicPr>
+        <p:blipFill>
+          <a:blip r:embed="rId2">
+            <a:extLst>
+              <a:ext uri="{28A0092B-C50C-407E-A947-70E740481C1C}">
+                <a14:useLocalDpi xmlns:a14="http://schemas.microsoft.com/office/drawing/2010/main" val="0"/>
+              </a:ext>
+            </a:extLst>
+          </a:blip>
+          <a:srcRect/>
+          <a:stretch>
+            <a:fillRect/>
+          </a:stretch>
+        </p:blipFill>
+        <p:spPr bwMode="auto">
+          <a:xfrm>
+            <a:off x="7770945" y="599455"/>
+            <a:ext cx="1373055" cy="307545"/>
+          </a:xfrm>
+          <a:prstGeom prst="rect">
+            <a:avLst/>
+          </a:prstGeom>
+          <a:noFill/>
+          <a:extLst>
+            <a:ext uri="{909E8E84-426E-40DD-AFC4-6F175D3DCCD1}">
+              <a14:hiddenFill xmlns:a14="http://schemas.microsoft.com/office/drawing/2010/main">
+                <a:solidFill>
+                  <a:srgbClr val="FFFFFF"/>
+                </a:solidFill>
+              </a14:hiddenFill>
+            </a:ext>
+          </a:extLst>
+        </p:spPr>
+      </p:pic>
+      <p:sp>
+        <p:nvSpPr>
+          <p:cNvPr id="5" name="Slide Number Placeholder 4"/>
+          <p:cNvSpPr>
+            <a:spLocks noGrp="1"/>
+          </p:cNvSpPr>
+          <p:nvPr>
+            <p:ph type="sldNum" sz="quarter" idx="12"/>
+          </p:nvPr>
+        </p:nvSpPr>
+        <p:spPr/>
+        <p:txBody>
+          <a:bodyPr/>
+          <a:lstStyle/>
+          <a:p>
+            <a:pPr algn="ctr"/>
+            <a:fld id="{82B5D99C-3243-4CCA-89CF-846763E29181}" type="slidenum">
+              <a:rPr lang="es-CL" smtClean="0"/>
+              <a:pPr algn="ctr"/>
+              <a:t>8</a:t>
+            </a:fld>
+            <a:endParaRPr lang="es-CL" dirty="0"/>
+          </a:p>
+        </p:txBody>
+      </p:sp>
+      <p:pic>
+        <p:nvPicPr>
+          <p:cNvPr id="8" name="Picture 7" descr="plan_de_proyecto - Word"/>
+          <p:cNvPicPr>
+            <a:picLocks noChangeAspect="1"/>
+          </p:cNvPicPr>
+          <p:nvPr/>
+        </p:nvPicPr>
+        <p:blipFill rotWithShape="1">
+          <a:blip r:embed="rId3">
+            <a:extLst>
+              <a:ext uri="{28A0092B-C50C-407E-A947-70E740481C1C}">
+                <a14:useLocalDpi xmlns:a14="http://schemas.microsoft.com/office/drawing/2010/main" val="0"/>
+              </a:ext>
+            </a:extLst>
+          </a:blip>
+          <a:srcRect l="21885" t="13724" r="12608" b="13859"/>
+          <a:stretch/>
+        </p:blipFill>
+        <p:spPr>
+          <a:xfrm>
+            <a:off x="1297993" y="2887313"/>
+            <a:ext cx="6282252" cy="3738773"/>
+          </a:xfrm>
+          <a:prstGeom prst="rect">
+            <a:avLst/>
+          </a:prstGeom>
+        </p:spPr>
+      </p:pic>
+    </p:spTree>
+    <p:extLst>
+      <p:ext uri="{BB962C8B-B14F-4D97-AF65-F5344CB8AC3E}">
+        <p14:creationId xmlns:p14="http://schemas.microsoft.com/office/powerpoint/2010/main" val="1100844812"/>
+      </p:ext>
+    </p:extLst>
+  </p:cSld>
+  <p:clrMapOvr>
+    <a:masterClrMapping/>
+  </p:clrMapOvr>
+</p:sld>
+</file>
+
+<file path=ppt/slides/slide9.xml><?xml version="1.0" encoding="utf-8"?>
+<p:sld xmlns:a="http://schemas.openxmlformats.org/drawingml/2006/main" xmlns:r="http://schemas.openxmlformats.org/officeDocument/2006/relationships" xmlns:p="http://schemas.openxmlformats.org/presentationml/2006/main">
+  <p:cSld>
+    <p:spTree>
+      <p:nvGrpSpPr>
+        <p:cNvPr id="1" name=""/>
+        <p:cNvGrpSpPr/>
+        <p:nvPr/>
+      </p:nvGrpSpPr>
+      <p:grpSpPr>
+        <a:xfrm>
+          <a:off x="0" y="0"/>
+          <a:ext cx="0" cy="0"/>
+          <a:chOff x="0" y="0"/>
+          <a:chExt cx="0" cy="0"/>
+        </a:xfrm>
+      </p:grpSpPr>
+      <p:sp>
+        <p:nvSpPr>
+          <p:cNvPr id="2" name="Title 1"/>
+          <p:cNvSpPr>
+            <a:spLocks noGrp="1"/>
+          </p:cNvSpPr>
+          <p:nvPr>
+            <p:ph type="title"/>
+          </p:nvPr>
+        </p:nvSpPr>
+        <p:spPr/>
+        <p:txBody>
+          <a:bodyPr/>
+          <a:lstStyle/>
+          <a:p>
+            <a:endParaRPr lang="es-CL" dirty="0"/>
+          </a:p>
+        </p:txBody>
+      </p:sp>
+      <p:sp>
+        <p:nvSpPr>
+          <p:cNvPr id="3" name="Content Placeholder 2"/>
+          <p:cNvSpPr>
+            <a:spLocks noGrp="1"/>
+          </p:cNvSpPr>
+          <p:nvPr>
+            <p:ph idx="1"/>
+          </p:nvPr>
+        </p:nvSpPr>
+        <p:spPr/>
+        <p:txBody>
+          <a:bodyPr/>
+          <a:lstStyle/>
+          <a:p>
+            <a:endParaRPr lang="es-CL" dirty="0"/>
+          </a:p>
+        </p:txBody>
+      </p:sp>
+      <p:pic>
+        <p:nvPicPr>
+          <p:cNvPr id="2050" name="Picture 2" descr="Resultado de imagen para duoc"/>
+          <p:cNvPicPr>
+            <a:picLocks noChangeAspect="1" noChangeArrowheads="1"/>
+          </p:cNvPicPr>
+          <p:nvPr/>
+        </p:nvPicPr>
+        <p:blipFill>
+          <a:blip r:embed="rId2">
+            <a:extLst>
+              <a:ext uri="{28A0092B-C50C-407E-A947-70E740481C1C}">
+                <a14:useLocalDpi xmlns:a14="http://schemas.microsoft.com/office/drawing/2010/main" val="0"/>
+              </a:ext>
+            </a:extLst>
+          </a:blip>
+          <a:srcRect/>
+          <a:stretch>
+            <a:fillRect/>
+          </a:stretch>
+        </p:blipFill>
+        <p:spPr bwMode="auto">
+          <a:xfrm>
+            <a:off x="7770945" y="599455"/>
+            <a:ext cx="1373055" cy="307545"/>
+          </a:xfrm>
+          <a:prstGeom prst="rect">
+            <a:avLst/>
+          </a:prstGeom>
+          <a:noFill/>
+          <a:extLst>
+            <a:ext uri="{909E8E84-426E-40DD-AFC4-6F175D3DCCD1}">
+              <a14:hiddenFill xmlns:a14="http://schemas.microsoft.com/office/drawing/2010/main">
+                <a:solidFill>
+                  <a:srgbClr val="FFFFFF"/>
+                </a:solidFill>
+              </a14:hiddenFill>
+            </a:ext>
+          </a:extLst>
+        </p:spPr>
+      </p:pic>
+      <p:sp>
+        <p:nvSpPr>
+          <p:cNvPr id="5" name="Slide Number Placeholder 4"/>
+          <p:cNvSpPr>
+            <a:spLocks noGrp="1"/>
+          </p:cNvSpPr>
+          <p:nvPr>
+            <p:ph type="sldNum" sz="quarter" idx="12"/>
+          </p:nvPr>
+        </p:nvSpPr>
+        <p:spPr/>
+        <p:txBody>
+          <a:bodyPr/>
+          <a:lstStyle/>
+          <a:p>
+            <a:pPr algn="ctr"/>
+            <a:fld id="{82B5D99C-3243-4CCA-89CF-846763E29181}" type="slidenum">
+              <a:rPr lang="es-CL" smtClean="0"/>
+              <a:pPr algn="ctr"/>
+              <a:t>9</a:t>
+            </a:fld>
+            <a:endParaRPr lang="es-CL" dirty="0"/>
+          </a:p>
+        </p:txBody>
+      </p:sp>
+    </p:spTree>
+    <p:extLst>
+      <p:ext uri="{BB962C8B-B14F-4D97-AF65-F5344CB8AC3E}">
+        <p14:creationId xmlns:p14="http://schemas.microsoft.com/office/powerpoint/2010/main" val="2520761892"/>
       </p:ext>
     </p:extLst>
   </p:cSld>

</xml_diff>